<commit_message>
modif word et diapo
</commit_message>
<xml_diff>
--- a/Etudiants/Thomas/Revue Projet/Revue 1/Thomas Cadeau Revue 1.pptx
+++ b/Etudiants/Thomas/Revue Projet/Revue 1/Thomas Cadeau Revue 1.pptx
@@ -264,7 +264,7 @@
           <a:p>
             <a:fld id="{A5A52D65-5D23-4759-866C-BD4D7E81B3B3}" type="datetimeFigureOut">
               <a:rPr lang="fr-FR" smtClean="0"/>
-              <a:t>29/01/2020</a:t>
+              <a:t>31/01/2020</a:t>
             </a:fld>
             <a:endParaRPr lang="fr-FR"/>
           </a:p>
@@ -462,7 +462,7 @@
           <a:p>
             <a:fld id="{A5A52D65-5D23-4759-866C-BD4D7E81B3B3}" type="datetimeFigureOut">
               <a:rPr lang="fr-FR" smtClean="0"/>
-              <a:t>29/01/2020</a:t>
+              <a:t>31/01/2020</a:t>
             </a:fld>
             <a:endParaRPr lang="fr-FR"/>
           </a:p>
@@ -670,7 +670,7 @@
           <a:p>
             <a:fld id="{A5A52D65-5D23-4759-866C-BD4D7E81B3B3}" type="datetimeFigureOut">
               <a:rPr lang="fr-FR" smtClean="0"/>
-              <a:t>29/01/2020</a:t>
+              <a:t>31/01/2020</a:t>
             </a:fld>
             <a:endParaRPr lang="fr-FR"/>
           </a:p>
@@ -868,7 +868,7 @@
           <a:p>
             <a:fld id="{A5A52D65-5D23-4759-866C-BD4D7E81B3B3}" type="datetimeFigureOut">
               <a:rPr lang="fr-FR" smtClean="0"/>
-              <a:t>29/01/2020</a:t>
+              <a:t>31/01/2020</a:t>
             </a:fld>
             <a:endParaRPr lang="fr-FR"/>
           </a:p>
@@ -1143,7 +1143,7 @@
           <a:p>
             <a:fld id="{A5A52D65-5D23-4759-866C-BD4D7E81B3B3}" type="datetimeFigureOut">
               <a:rPr lang="fr-FR" smtClean="0"/>
-              <a:t>29/01/2020</a:t>
+              <a:t>31/01/2020</a:t>
             </a:fld>
             <a:endParaRPr lang="fr-FR"/>
           </a:p>
@@ -1408,7 +1408,7 @@
           <a:p>
             <a:fld id="{A5A52D65-5D23-4759-866C-BD4D7E81B3B3}" type="datetimeFigureOut">
               <a:rPr lang="fr-FR" smtClean="0"/>
-              <a:t>29/01/2020</a:t>
+              <a:t>31/01/2020</a:t>
             </a:fld>
             <a:endParaRPr lang="fr-FR"/>
           </a:p>
@@ -1820,7 +1820,7 @@
           <a:p>
             <a:fld id="{A5A52D65-5D23-4759-866C-BD4D7E81B3B3}" type="datetimeFigureOut">
               <a:rPr lang="fr-FR" smtClean="0"/>
-              <a:t>29/01/2020</a:t>
+              <a:t>31/01/2020</a:t>
             </a:fld>
             <a:endParaRPr lang="fr-FR"/>
           </a:p>
@@ -1961,7 +1961,7 @@
           <a:p>
             <a:fld id="{A5A52D65-5D23-4759-866C-BD4D7E81B3B3}" type="datetimeFigureOut">
               <a:rPr lang="fr-FR" smtClean="0"/>
-              <a:t>29/01/2020</a:t>
+              <a:t>31/01/2020</a:t>
             </a:fld>
             <a:endParaRPr lang="fr-FR"/>
           </a:p>
@@ -2074,7 +2074,7 @@
           <a:p>
             <a:fld id="{A5A52D65-5D23-4759-866C-BD4D7E81B3B3}" type="datetimeFigureOut">
               <a:rPr lang="fr-FR" smtClean="0"/>
-              <a:t>29/01/2020</a:t>
+              <a:t>31/01/2020</a:t>
             </a:fld>
             <a:endParaRPr lang="fr-FR"/>
           </a:p>
@@ -2385,7 +2385,7 @@
           <a:p>
             <a:fld id="{A5A52D65-5D23-4759-866C-BD4D7E81B3B3}" type="datetimeFigureOut">
               <a:rPr lang="fr-FR" smtClean="0"/>
-              <a:t>29/01/2020</a:t>
+              <a:t>31/01/2020</a:t>
             </a:fld>
             <a:endParaRPr lang="fr-FR"/>
           </a:p>
@@ -2673,7 +2673,7 @@
           <a:p>
             <a:fld id="{A5A52D65-5D23-4759-866C-BD4D7E81B3B3}" type="datetimeFigureOut">
               <a:rPr lang="fr-FR" smtClean="0"/>
-              <a:t>29/01/2020</a:t>
+              <a:t>31/01/2020</a:t>
             </a:fld>
             <a:endParaRPr lang="fr-FR"/>
           </a:p>
@@ -2914,7 +2914,7 @@
           <a:p>
             <a:fld id="{A5A52D65-5D23-4759-866C-BD4D7E81B3B3}" type="datetimeFigureOut">
               <a:rPr lang="fr-FR" smtClean="0"/>
-              <a:t>29/01/2020</a:t>
+              <a:t>31/01/2020</a:t>
             </a:fld>
             <a:endParaRPr lang="fr-FR"/>
           </a:p>
@@ -6919,6 +6919,202 @@
           </a:prstGeom>
         </p:spPr>
       </p:pic>
+      <p:pic>
+        <p:nvPicPr>
+          <p:cNvPr id="4" name="Image 3">
+            <a:extLst>
+              <a:ext uri="{FF2B5EF4-FFF2-40B4-BE49-F238E27FC236}">
+                <a16:creationId xmlns:a16="http://schemas.microsoft.com/office/drawing/2014/main" id="{D0641EF9-342F-4D19-891A-C40A0E2AD262}"/>
+              </a:ext>
+            </a:extLst>
+          </p:cNvPr>
+          <p:cNvPicPr>
+            <a:picLocks noChangeAspect="1"/>
+          </p:cNvPicPr>
+          <p:nvPr/>
+        </p:nvPicPr>
+        <p:blipFill>
+          <a:blip r:embed="rId3"/>
+          <a:stretch>
+            <a:fillRect/>
+          </a:stretch>
+        </p:blipFill>
+        <p:spPr>
+          <a:xfrm>
+            <a:off x="3049409" y="1420798"/>
+            <a:ext cx="2014056" cy="2014056"/>
+          </a:xfrm>
+          <a:prstGeom prst="rect">
+            <a:avLst/>
+          </a:prstGeom>
+        </p:spPr>
+      </p:pic>
+      <p:pic>
+        <p:nvPicPr>
+          <p:cNvPr id="5" name="Image 4">
+            <a:extLst>
+              <a:ext uri="{FF2B5EF4-FFF2-40B4-BE49-F238E27FC236}">
+                <a16:creationId xmlns:a16="http://schemas.microsoft.com/office/drawing/2014/main" id="{EEBAC794-CE09-4D77-8B21-1EA7F0DB7600}"/>
+              </a:ext>
+            </a:extLst>
+          </p:cNvPr>
+          <p:cNvPicPr>
+            <a:picLocks noChangeAspect="1"/>
+          </p:cNvPicPr>
+          <p:nvPr/>
+        </p:nvPicPr>
+        <p:blipFill>
+          <a:blip r:embed="rId4">
+            <a:extLst>
+              <a:ext uri="{28A0092B-C50C-407E-A947-70E740481C1C}">
+                <a14:useLocalDpi xmlns:a14="http://schemas.microsoft.com/office/drawing/2010/main" val="0"/>
+              </a:ext>
+            </a:extLst>
+          </a:blip>
+          <a:stretch>
+            <a:fillRect/>
+          </a:stretch>
+        </p:blipFill>
+        <p:spPr>
+          <a:xfrm>
+            <a:off x="6722466" y="1691861"/>
+            <a:ext cx="1905266" cy="1905266"/>
+          </a:xfrm>
+          <a:prstGeom prst="rect">
+            <a:avLst/>
+          </a:prstGeom>
+        </p:spPr>
+      </p:pic>
+      <p:sp>
+        <p:nvSpPr>
+          <p:cNvPr id="2" name="Rectangle 1">
+            <a:extLst>
+              <a:ext uri="{FF2B5EF4-FFF2-40B4-BE49-F238E27FC236}">
+                <a16:creationId xmlns:a16="http://schemas.microsoft.com/office/drawing/2014/main" id="{8E81247F-3036-475E-8B14-E758E49D8CB8}"/>
+              </a:ext>
+            </a:extLst>
+          </p:cNvPr>
+          <p:cNvSpPr/>
+          <p:nvPr/>
+        </p:nvSpPr>
+        <p:spPr>
+          <a:xfrm>
+            <a:off x="2421535" y="3427949"/>
+            <a:ext cx="3048000" cy="923330"/>
+          </a:xfrm>
+          <a:prstGeom prst="rect">
+            <a:avLst/>
+          </a:prstGeom>
+        </p:spPr>
+        <p:txBody>
+          <a:bodyPr wrap="square">
+            <a:spAutoFit/>
+          </a:bodyPr>
+          <a:lstStyle/>
+          <a:p>
+            <a:pPr marL="342900" lvl="0" indent="-342900">
+              <a:spcAft>
+                <a:spcPts val="0"/>
+              </a:spcAft>
+              <a:buFont typeface="Wingdings" panose="05000000000000000000" pitchFamily="2" charset="2"/>
+              <a:buChar char=""/>
+            </a:pPr>
+            <a:r>
+              <a:rPr lang="fr-FR" dirty="0">
+                <a:latin typeface="Calibri" panose="020F0502020204030204" pitchFamily="34" charset="0"/>
+                <a:ea typeface="Calibri" panose="020F0502020204030204" pitchFamily="34" charset="0"/>
+                <a:cs typeface="Times New Roman" panose="02020603050405020304" pitchFamily="18" charset="0"/>
+              </a:rPr>
+              <a:t>Référence : </a:t>
+            </a:r>
+            <a:r>
+              <a:rPr lang="fr-FR" dirty="0">
+                <a:solidFill>
+                  <a:srgbClr val="FF0000"/>
+                </a:solidFill>
+                <a:latin typeface="Calibri" panose="020F0502020204030204" pitchFamily="34" charset="0"/>
+                <a:ea typeface="Calibri" panose="020F0502020204030204" pitchFamily="34" charset="0"/>
+                <a:cs typeface="Times New Roman" panose="02020603050405020304" pitchFamily="18" charset="0"/>
+              </a:rPr>
+              <a:t>BDT 250</a:t>
+            </a:r>
+            <a:endParaRPr lang="fr-FR" dirty="0">
+              <a:latin typeface="Calibri" panose="020F0502020204030204" pitchFamily="34" charset="0"/>
+              <a:ea typeface="Calibri" panose="020F0502020204030204" pitchFamily="34" charset="0"/>
+              <a:cs typeface="Times New Roman" panose="02020603050405020304" pitchFamily="18" charset="0"/>
+            </a:endParaRPr>
+          </a:p>
+          <a:p>
+            <a:pPr marL="342900" lvl="0" indent="-342900">
+              <a:spcAft>
+                <a:spcPts val="0"/>
+              </a:spcAft>
+              <a:buFont typeface="Wingdings" panose="05000000000000000000" pitchFamily="2" charset="2"/>
+              <a:buChar char=""/>
+            </a:pPr>
+            <a:r>
+              <a:rPr lang="fr-FR" dirty="0">
+                <a:latin typeface="Calibri" panose="020F0502020204030204" pitchFamily="34" charset="0"/>
+                <a:ea typeface="Calibri" panose="020F0502020204030204" pitchFamily="34" charset="0"/>
+                <a:cs typeface="Times New Roman" panose="02020603050405020304" pitchFamily="18" charset="0"/>
+              </a:rPr>
+              <a:t>Signal : </a:t>
+            </a:r>
+            <a:r>
+              <a:rPr lang="fr-FR" dirty="0">
+                <a:solidFill>
+                  <a:srgbClr val="0070C0"/>
+                </a:solidFill>
+                <a:latin typeface="Calibri" panose="020F0502020204030204" pitchFamily="34" charset="0"/>
+                <a:ea typeface="Calibri" panose="020F0502020204030204" pitchFamily="34" charset="0"/>
+                <a:cs typeface="Times New Roman" panose="02020603050405020304" pitchFamily="18" charset="0"/>
+              </a:rPr>
+              <a:t>Numérique</a:t>
+            </a:r>
+            <a:r>
+              <a:rPr lang="fr-FR" dirty="0">
+                <a:latin typeface="Calibri" panose="020F0502020204030204" pitchFamily="34" charset="0"/>
+                <a:ea typeface="Calibri" panose="020F0502020204030204" pitchFamily="34" charset="0"/>
+                <a:cs typeface="Times New Roman" panose="02020603050405020304" pitchFamily="18" charset="0"/>
+              </a:rPr>
+              <a:t> </a:t>
+            </a:r>
+          </a:p>
+          <a:p>
+            <a:pPr marL="342900" lvl="0" indent="-342900">
+              <a:spcAft>
+                <a:spcPts val="0"/>
+              </a:spcAft>
+              <a:buFont typeface="Wingdings" panose="05000000000000000000" pitchFamily="2" charset="2"/>
+              <a:buChar char=""/>
+            </a:pPr>
+            <a:r>
+              <a:rPr lang="fr-FR" dirty="0">
+                <a:latin typeface="Calibri" panose="020F0502020204030204" pitchFamily="34" charset="0"/>
+                <a:ea typeface="Calibri" panose="020F0502020204030204" pitchFamily="34" charset="0"/>
+                <a:cs typeface="Times New Roman" panose="02020603050405020304" pitchFamily="18" charset="0"/>
+              </a:rPr>
+              <a:t>Voltage : </a:t>
+            </a:r>
+            <a:r>
+              <a:rPr lang="fr-FR" dirty="0">
+                <a:solidFill>
+                  <a:srgbClr val="0070C0"/>
+                </a:solidFill>
+                <a:latin typeface="Calibri" panose="020F0502020204030204" pitchFamily="34" charset="0"/>
+                <a:ea typeface="Calibri" panose="020F0502020204030204" pitchFamily="34" charset="0"/>
+                <a:cs typeface="Times New Roman" panose="02020603050405020304" pitchFamily="18" charset="0"/>
+              </a:rPr>
+              <a:t>0-5V</a:t>
+            </a:r>
+            <a:endParaRPr lang="fr-FR" dirty="0">
+              <a:latin typeface="Calibri" panose="020F0502020204030204" pitchFamily="34" charset="0"/>
+              <a:ea typeface="Calibri" panose="020F0502020204030204" pitchFamily="34" charset="0"/>
+              <a:cs typeface="Times New Roman" panose="02020603050405020304" pitchFamily="18" charset="0"/>
+            </a:endParaRPr>
+          </a:p>
+        </p:txBody>
+      </p:sp>
     </p:spTree>
     <p:extLst>
       <p:ext uri="{BB962C8B-B14F-4D97-AF65-F5344CB8AC3E}">

</xml_diff>